<commit_message>
continue el power point, falta terminar
</commit_message>
<xml_diff>
--- a/Huella de carbono.pptx
+++ b/Huella de carbono.pptx
@@ -9,6 +9,9 @@
     <p:sldId id="257" r:id="rId3"/>
     <p:sldId id="258" r:id="rId4"/>
     <p:sldId id="265" r:id="rId5"/>
+    <p:sldId id="261" r:id="rId6"/>
+    <p:sldId id="263" r:id="rId7"/>
+    <p:sldId id="262" r:id="rId8"/>
   </p:sldIdLst>
   <p:sldSz cx="9906000" cy="6858000" type="A4"/>
   <p:notesSz cx="6858000" cy="9144000"/>
@@ -631,7 +634,7 @@
           <a:p>
             <a:fld id="{E978C95F-D383-4067-BAAB-1BCD0C674698}" type="datetimeFigureOut">
               <a:rPr lang="es-ES" smtClean="0"/>
-              <a:t>15/10/2020</a:t>
+              <a:t>20/10/2020</a:t>
             </a:fld>
             <a:endParaRPr lang="es-ES"/>
           </a:p>
@@ -732,7 +735,7 @@
           </a:ln>
           <a:extLst>
             <a:ext uri="{91240B29-F687-4f45-9708-019B960494DF}">
-              <a14:hiddenLine xmlns="" xmlns:a14="http://schemas.microsoft.com/office/drawing/2010/main" w="9525">
+              <a14:hiddenLine xmlns:a14="http://schemas.microsoft.com/office/drawing/2010/main" xmlns="" w="9525">
                 <a:solidFill>
                   <a:srgbClr val="000000"/>
                 </a:solidFill>
@@ -787,7 +790,7 @@
           </a:ln>
           <a:extLst>
             <a:ext uri="{91240B29-F687-4f45-9708-019B960494DF}">
-              <a14:hiddenLine xmlns="" xmlns:a14="http://schemas.microsoft.com/office/drawing/2010/main" w="9525">
+              <a14:hiddenLine xmlns:a14="http://schemas.microsoft.com/office/drawing/2010/main" xmlns="" w="9525">
                 <a:solidFill>
                   <a:srgbClr val="000000"/>
                 </a:solidFill>
@@ -1047,7 +1050,7 @@
           <a:p>
             <a:fld id="{E978C95F-D383-4067-BAAB-1BCD0C674698}" type="datetimeFigureOut">
               <a:rPr lang="es-ES" smtClean="0"/>
-              <a:t>15/10/2020</a:t>
+              <a:t>20/10/2020</a:t>
             </a:fld>
             <a:endParaRPr lang="es-ES"/>
           </a:p>
@@ -1295,7 +1298,7 @@
           <a:p>
             <a:fld id="{E978C95F-D383-4067-BAAB-1BCD0C674698}" type="datetimeFigureOut">
               <a:rPr lang="es-ES" smtClean="0"/>
-              <a:t>15/10/2020</a:t>
+              <a:t>20/10/2020</a:t>
             </a:fld>
             <a:endParaRPr lang="es-ES"/>
           </a:p>
@@ -1835,7 +1838,7 @@
           <a:p>
             <a:fld id="{E978C95F-D383-4067-BAAB-1BCD0C674698}" type="datetimeFigureOut">
               <a:rPr lang="es-ES" smtClean="0"/>
-              <a:t>15/10/2020</a:t>
+              <a:t>20/10/2020</a:t>
             </a:fld>
             <a:endParaRPr lang="es-ES"/>
           </a:p>
@@ -2083,7 +2086,7 @@
           <a:p>
             <a:fld id="{E978C95F-D383-4067-BAAB-1BCD0C674698}" type="datetimeFigureOut">
               <a:rPr lang="es-ES" smtClean="0"/>
-              <a:t>15/10/2020</a:t>
+              <a:t>20/10/2020</a:t>
             </a:fld>
             <a:endParaRPr lang="es-ES"/>
           </a:p>
@@ -2615,7 +2618,7 @@
           <a:p>
             <a:fld id="{E978C95F-D383-4067-BAAB-1BCD0C674698}" type="datetimeFigureOut">
               <a:rPr lang="es-ES" smtClean="0"/>
-              <a:t>15/10/2020</a:t>
+              <a:t>20/10/2020</a:t>
             </a:fld>
             <a:endParaRPr lang="es-ES"/>
           </a:p>
@@ -2912,7 +2915,7 @@
           <a:p>
             <a:fld id="{E978C95F-D383-4067-BAAB-1BCD0C674698}" type="datetimeFigureOut">
               <a:rPr lang="es-ES" smtClean="0"/>
-              <a:t>15/10/2020</a:t>
+              <a:t>20/10/2020</a:t>
             </a:fld>
             <a:endParaRPr lang="es-ES"/>
           </a:p>
@@ -3086,7 +3089,7 @@
           <a:p>
             <a:fld id="{E978C95F-D383-4067-BAAB-1BCD0C674698}" type="datetimeFigureOut">
               <a:rPr lang="es-ES" smtClean="0"/>
-              <a:t>15/10/2020</a:t>
+              <a:t>20/10/2020</a:t>
             </a:fld>
             <a:endParaRPr lang="es-ES"/>
           </a:p>
@@ -3266,7 +3269,7 @@
           <a:p>
             <a:fld id="{E978C95F-D383-4067-BAAB-1BCD0C674698}" type="datetimeFigureOut">
               <a:rPr lang="es-ES" smtClean="0"/>
-              <a:t>15/10/2020</a:t>
+              <a:t>20/10/2020</a:t>
             </a:fld>
             <a:endParaRPr lang="es-ES"/>
           </a:p>
@@ -3451,7 +3454,7 @@
           <a:p>
             <a:fld id="{E978C95F-D383-4067-BAAB-1BCD0C674698}" type="datetimeFigureOut">
               <a:rPr lang="es-ES" smtClean="0"/>
-              <a:t>15/10/2020</a:t>
+              <a:t>20/10/2020</a:t>
             </a:fld>
             <a:endParaRPr lang="es-ES"/>
           </a:p>
@@ -3707,7 +3710,7 @@
           <a:p>
             <a:fld id="{E978C95F-D383-4067-BAAB-1BCD0C674698}" type="datetimeFigureOut">
               <a:rPr lang="es-ES" smtClean="0"/>
-              <a:t>15/10/2020</a:t>
+              <a:t>20/10/2020</a:t>
             </a:fld>
             <a:endParaRPr lang="es-ES"/>
           </a:p>
@@ -4009,7 +4012,7 @@
           <a:p>
             <a:fld id="{E978C95F-D383-4067-BAAB-1BCD0C674698}" type="datetimeFigureOut">
               <a:rPr lang="es-ES" smtClean="0"/>
-              <a:t>15/10/2020</a:t>
+              <a:t>20/10/2020</a:t>
             </a:fld>
             <a:endParaRPr lang="es-ES"/>
           </a:p>
@@ -4451,7 +4454,7 @@
           <a:p>
             <a:fld id="{E978C95F-D383-4067-BAAB-1BCD0C674698}" type="datetimeFigureOut">
               <a:rPr lang="es-ES" smtClean="0"/>
-              <a:t>15/10/2020</a:t>
+              <a:t>20/10/2020</a:t>
             </a:fld>
             <a:endParaRPr lang="es-ES"/>
           </a:p>
@@ -4569,7 +4572,7 @@
           <a:p>
             <a:fld id="{E978C95F-D383-4067-BAAB-1BCD0C674698}" type="datetimeFigureOut">
               <a:rPr lang="es-ES" smtClean="0"/>
-              <a:t>15/10/2020</a:t>
+              <a:t>20/10/2020</a:t>
             </a:fld>
             <a:endParaRPr lang="es-ES"/>
           </a:p>
@@ -4664,7 +4667,7 @@
           <a:p>
             <a:fld id="{E978C95F-D383-4067-BAAB-1BCD0C674698}" type="datetimeFigureOut">
               <a:rPr lang="es-ES" smtClean="0"/>
-              <a:t>15/10/2020</a:t>
+              <a:t>20/10/2020</a:t>
             </a:fld>
             <a:endParaRPr lang="es-ES"/>
           </a:p>
@@ -4952,7 +4955,7 @@
           <a:p>
             <a:fld id="{E978C95F-D383-4067-BAAB-1BCD0C674698}" type="datetimeFigureOut">
               <a:rPr lang="es-ES" smtClean="0"/>
-              <a:t>15/10/2020</a:t>
+              <a:t>20/10/2020</a:t>
             </a:fld>
             <a:endParaRPr lang="es-ES"/>
           </a:p>
@@ -5248,7 +5251,7 @@
           <a:p>
             <a:fld id="{E978C95F-D383-4067-BAAB-1BCD0C674698}" type="datetimeFigureOut">
               <a:rPr lang="es-ES" smtClean="0"/>
-              <a:t>15/10/2020</a:t>
+              <a:t>20/10/2020</a:t>
             </a:fld>
             <a:endParaRPr lang="es-ES"/>
           </a:p>
@@ -5772,7 +5775,7 @@
           <a:p>
             <a:fld id="{E978C95F-D383-4067-BAAB-1BCD0C674698}" type="datetimeFigureOut">
               <a:rPr lang="es-ES" smtClean="0"/>
-              <a:t>15/10/2020</a:t>
+              <a:t>20/10/2020</a:t>
             </a:fld>
             <a:endParaRPr lang="es-ES"/>
           </a:p>
@@ -7102,6 +7105,1550 @@
 </p:sld>
 </file>
 
+<file path=ppt/slides/slide5.xml><?xml version="1.0" encoding="utf-8"?>
+<p:sld xmlns:a="http://schemas.openxmlformats.org/drawingml/2006/main" xmlns:r="http://schemas.openxmlformats.org/officeDocument/2006/relationships" xmlns:p="http://schemas.openxmlformats.org/presentationml/2006/main">
+  <p:cSld>
+    <p:spTree>
+      <p:nvGrpSpPr>
+        <p:cNvPr id="1" name=""/>
+        <p:cNvGrpSpPr/>
+        <p:nvPr/>
+      </p:nvGrpSpPr>
+      <p:grpSpPr>
+        <a:xfrm>
+          <a:off x="0" y="0"/>
+          <a:ext cx="0" cy="0"/>
+          <a:chOff x="0" y="0"/>
+          <a:chExt cx="0" cy="0"/>
+        </a:xfrm>
+      </p:grpSpPr>
+      <p:pic>
+        <p:nvPicPr>
+          <p:cNvPr id="9" name="Marcador de contenido 3"/>
+          <p:cNvPicPr>
+            <a:picLocks noGrp="1"/>
+          </p:cNvPicPr>
+          <p:nvPr>
+            <p:ph idx="1"/>
+          </p:nvPr>
+        </p:nvPicPr>
+        <p:blipFill>
+          <a:blip r:embed="rId2">
+            <a:extLst>
+              <a:ext uri="{28A0092B-C50C-407E-A947-70E740481C1C}">
+                <a14:useLocalDpi xmlns:a14="http://schemas.microsoft.com/office/drawing/2010/main" val="0"/>
+              </a:ext>
+            </a:extLst>
+          </a:blip>
+          <a:srcRect/>
+          <a:stretch>
+            <a:fillRect/>
+          </a:stretch>
+        </p:blipFill>
+        <p:spPr bwMode="auto">
+          <a:xfrm>
+            <a:off x="1427018" y="2050473"/>
+            <a:ext cx="7915798" cy="3811561"/>
+          </a:xfrm>
+          <a:prstGeom prst="rect">
+            <a:avLst/>
+          </a:prstGeom>
+          <a:noFill/>
+          <a:ln>
+            <a:noFill/>
+          </a:ln>
+        </p:spPr>
+      </p:pic>
+      <p:sp>
+        <p:nvSpPr>
+          <p:cNvPr id="10" name="Title 1"/>
+          <p:cNvSpPr>
+            <a:spLocks noGrp="1"/>
+          </p:cNvSpPr>
+          <p:nvPr>
+            <p:ph type="title"/>
+          </p:nvPr>
+        </p:nvSpPr>
+        <p:spPr>
+          <a:xfrm>
+            <a:off x="996093" y="360218"/>
+            <a:ext cx="8346723" cy="1224527"/>
+          </a:xfrm>
+        </p:spPr>
+        <p:txBody>
+          <a:bodyPr>
+            <a:normAutofit/>
+          </a:bodyPr>
+          <a:lstStyle/>
+          <a:p>
+            <a:r>
+              <a:rPr lang="es-ES" sz="5400" b="1" dirty="0">
+                <a:ln w="22225">
+                  <a:solidFill>
+                    <a:schemeClr val="accent1">
+                      <a:lumMod val="75000"/>
+                    </a:schemeClr>
+                  </a:solidFill>
+                  <a:prstDash val="solid"/>
+                </a:ln>
+                <a:solidFill>
+                  <a:schemeClr val="accent1">
+                    <a:lumMod val="60000"/>
+                    <a:lumOff val="40000"/>
+                  </a:schemeClr>
+                </a:solidFill>
+              </a:rPr>
+              <a:t>Graficas</a:t>
+            </a:r>
+            <a:endParaRPr lang="es-ES" sz="5400" dirty="0"/>
+          </a:p>
+        </p:txBody>
+      </p:sp>
+    </p:spTree>
+    <p:extLst>
+      <p:ext uri="{BB962C8B-B14F-4D97-AF65-F5344CB8AC3E}">
+        <p14:creationId xmlns:p14="http://schemas.microsoft.com/office/powerpoint/2010/main" val="3458364837"/>
+      </p:ext>
+    </p:extLst>
+  </p:cSld>
+  <p:clrMapOvr>
+    <a:masterClrMapping/>
+  </p:clrMapOvr>
+</p:sld>
+</file>
+
+<file path=ppt/slides/slide6.xml><?xml version="1.0" encoding="utf-8"?>
+<p:sld xmlns:a="http://schemas.openxmlformats.org/drawingml/2006/main" xmlns:r="http://schemas.openxmlformats.org/officeDocument/2006/relationships" xmlns:p="http://schemas.openxmlformats.org/presentationml/2006/main">
+  <p:cSld>
+    <p:spTree>
+      <p:nvGrpSpPr>
+        <p:cNvPr id="1" name=""/>
+        <p:cNvGrpSpPr/>
+        <p:nvPr/>
+      </p:nvGrpSpPr>
+      <p:grpSpPr>
+        <a:xfrm>
+          <a:off x="0" y="0"/>
+          <a:ext cx="0" cy="0"/>
+          <a:chOff x="0" y="0"/>
+          <a:chExt cx="0" cy="0"/>
+        </a:xfrm>
+      </p:grpSpPr>
+      <p:graphicFrame>
+        <p:nvGraphicFramePr>
+          <p:cNvPr id="4" name="Marcador de contenido 7"/>
+          <p:cNvGraphicFramePr>
+            <a:graphicFrameLocks/>
+          </p:cNvGraphicFramePr>
+          <p:nvPr/>
+        </p:nvGraphicFramePr>
+        <p:xfrm>
+          <a:off x="1457943" y="3283527"/>
+          <a:ext cx="8057556" cy="2618511"/>
+        </p:xfrm>
+        <a:graphic>
+          <a:graphicData uri="http://schemas.openxmlformats.org/drawingml/2006/table">
+            <a:tbl>
+              <a:tblPr firstRow="1" firstCol="1" bandRow="1">
+                <a:tableStyleId>{5C22544A-7EE6-4342-B048-85BDC9FD1C3A}</a:tableStyleId>
+              </a:tblPr>
+              <a:tblGrid>
+                <a:gridCol w="2014389">
+                  <a:extLst>
+                    <a:ext uri="{9D8B030D-6E8A-4147-A177-3AD203B41FA5}">
+                      <a16:colId xmlns:a16="http://schemas.microsoft.com/office/drawing/2014/main" val="1219878907"/>
+                    </a:ext>
+                  </a:extLst>
+                </a:gridCol>
+                <a:gridCol w="2014389">
+                  <a:extLst>
+                    <a:ext uri="{9D8B030D-6E8A-4147-A177-3AD203B41FA5}">
+                      <a16:colId xmlns:a16="http://schemas.microsoft.com/office/drawing/2014/main" val="3071389198"/>
+                    </a:ext>
+                  </a:extLst>
+                </a:gridCol>
+                <a:gridCol w="2014389">
+                  <a:extLst>
+                    <a:ext uri="{9D8B030D-6E8A-4147-A177-3AD203B41FA5}">
+                      <a16:colId xmlns:a16="http://schemas.microsoft.com/office/drawing/2014/main" val="1365078288"/>
+                    </a:ext>
+                  </a:extLst>
+                </a:gridCol>
+                <a:gridCol w="2014389">
+                  <a:extLst>
+                    <a:ext uri="{9D8B030D-6E8A-4147-A177-3AD203B41FA5}">
+                      <a16:colId xmlns:a16="http://schemas.microsoft.com/office/drawing/2014/main" val="177014943"/>
+                    </a:ext>
+                  </a:extLst>
+                </a:gridCol>
+              </a:tblGrid>
+              <a:tr h="732036">
+                <a:tc>
+                  <a:txBody>
+                    <a:bodyPr/>
+                    <a:lstStyle/>
+                    <a:p>
+                      <a:pPr algn="ctr">
+                        <a:lnSpc>
+                          <a:spcPct val="115000"/>
+                        </a:lnSpc>
+                        <a:spcAft>
+                          <a:spcPts val="0"/>
+                        </a:spcAft>
+                      </a:pPr>
+                      <a:r>
+                        <a:rPr lang="es-ES" sz="1200" dirty="0">
+                          <a:effectLst/>
+                        </a:rPr>
+                        <a:t>Combustible(Dato de actividad)</a:t>
+                      </a:r>
+                      <a:endParaRPr lang="es-AR" sz="1100" dirty="0">
+                        <a:effectLst/>
+                        <a:latin typeface="Calibri" panose="020F0502020204030204" pitchFamily="34" charset="0"/>
+                        <a:ea typeface="Times New Roman" panose="02020603050405020304" pitchFamily="18" charset="0"/>
+                        <a:cs typeface="Times New Roman" panose="02020603050405020304" pitchFamily="18" charset="0"/>
+                      </a:endParaRPr>
+                    </a:p>
+                  </a:txBody>
+                  <a:tcPr marL="68580" marR="68580" marT="0" marB="0"/>
+                </a:tc>
+                <a:tc>
+                  <a:txBody>
+                    <a:bodyPr/>
+                    <a:lstStyle/>
+                    <a:p>
+                      <a:pPr algn="ctr">
+                        <a:lnSpc>
+                          <a:spcPct val="115000"/>
+                        </a:lnSpc>
+                        <a:spcAft>
+                          <a:spcPts val="0"/>
+                        </a:spcAft>
+                      </a:pPr>
+                      <a:r>
+                        <a:rPr lang="es-ES" sz="1200" dirty="0">
+                          <a:effectLst/>
+                        </a:rPr>
+                        <a:t>Abreviación</a:t>
+                      </a:r>
+                      <a:endParaRPr lang="es-AR" sz="1100" dirty="0">
+                        <a:effectLst/>
+                        <a:latin typeface="Calibri" panose="020F0502020204030204" pitchFamily="34" charset="0"/>
+                        <a:ea typeface="Times New Roman" panose="02020603050405020304" pitchFamily="18" charset="0"/>
+                        <a:cs typeface="Times New Roman" panose="02020603050405020304" pitchFamily="18" charset="0"/>
+                      </a:endParaRPr>
+                    </a:p>
+                  </a:txBody>
+                  <a:tcPr marL="68580" marR="68580" marT="0" marB="0"/>
+                </a:tc>
+                <a:tc>
+                  <a:txBody>
+                    <a:bodyPr/>
+                    <a:lstStyle/>
+                    <a:p>
+                      <a:pPr algn="ctr">
+                        <a:lnSpc>
+                          <a:spcPct val="115000"/>
+                        </a:lnSpc>
+                        <a:spcAft>
+                          <a:spcPts val="0"/>
+                        </a:spcAft>
+                      </a:pPr>
+                      <a:r>
+                        <a:rPr lang="es-ES" sz="1200" dirty="0">
+                          <a:effectLst/>
+                        </a:rPr>
+                        <a:t>Unidad de medición</a:t>
+                      </a:r>
+                      <a:endParaRPr lang="es-AR" sz="1100" dirty="0">
+                        <a:effectLst/>
+                        <a:latin typeface="Calibri" panose="020F0502020204030204" pitchFamily="34" charset="0"/>
+                        <a:ea typeface="Times New Roman" panose="02020603050405020304" pitchFamily="18" charset="0"/>
+                        <a:cs typeface="Times New Roman" panose="02020603050405020304" pitchFamily="18" charset="0"/>
+                      </a:endParaRPr>
+                    </a:p>
+                  </a:txBody>
+                  <a:tcPr marL="68580" marR="68580" marT="0" marB="0"/>
+                </a:tc>
+                <a:tc>
+                  <a:txBody>
+                    <a:bodyPr/>
+                    <a:lstStyle/>
+                    <a:p>
+                      <a:pPr algn="ctr">
+                        <a:lnSpc>
+                          <a:spcPct val="115000"/>
+                        </a:lnSpc>
+                        <a:spcAft>
+                          <a:spcPts val="0"/>
+                        </a:spcAft>
+                      </a:pPr>
+                      <a:r>
+                        <a:rPr lang="es-ES" sz="1200" dirty="0">
+                          <a:effectLst/>
+                        </a:rPr>
+                        <a:t>Factor de emisión</a:t>
+                      </a:r>
+                      <a:endParaRPr lang="es-AR" sz="1100" dirty="0">
+                        <a:effectLst/>
+                        <a:latin typeface="Calibri" panose="020F0502020204030204" pitchFamily="34" charset="0"/>
+                        <a:ea typeface="Times New Roman" panose="02020603050405020304" pitchFamily="18" charset="0"/>
+                        <a:cs typeface="Times New Roman" panose="02020603050405020304" pitchFamily="18" charset="0"/>
+                      </a:endParaRPr>
+                    </a:p>
+                  </a:txBody>
+                  <a:tcPr marL="68580" marR="68580" marT="0" marB="0"/>
+                </a:tc>
+                <a:extLst>
+                  <a:ext uri="{0D108BD9-81ED-4DB2-BD59-A6C34878D82A}">
+                    <a16:rowId xmlns:a16="http://schemas.microsoft.com/office/drawing/2014/main" val="3381222016"/>
+                  </a:ext>
+                </a:extLst>
+              </a:tr>
+              <a:tr h="465512">
+                <a:tc>
+                  <a:txBody>
+                    <a:bodyPr/>
+                    <a:lstStyle/>
+                    <a:p>
+                      <a:pPr algn="just">
+                        <a:lnSpc>
+                          <a:spcPct val="115000"/>
+                        </a:lnSpc>
+                        <a:spcAft>
+                          <a:spcPts val="0"/>
+                        </a:spcAft>
+                      </a:pPr>
+                      <a:r>
+                        <a:rPr lang="es-ES" sz="1200">
+                          <a:effectLst/>
+                        </a:rPr>
+                        <a:t>Gas Natural</a:t>
+                      </a:r>
+                      <a:endParaRPr lang="es-AR" sz="1100">
+                        <a:effectLst/>
+                        <a:latin typeface="Calibri" panose="020F0502020204030204" pitchFamily="34" charset="0"/>
+                        <a:ea typeface="Times New Roman" panose="02020603050405020304" pitchFamily="18" charset="0"/>
+                        <a:cs typeface="Times New Roman" panose="02020603050405020304" pitchFamily="18" charset="0"/>
+                      </a:endParaRPr>
+                    </a:p>
+                  </a:txBody>
+                  <a:tcPr marL="68580" marR="68580" marT="0" marB="0"/>
+                </a:tc>
+                <a:tc>
+                  <a:txBody>
+                    <a:bodyPr/>
+                    <a:lstStyle/>
+                    <a:p>
+                      <a:pPr algn="just">
+                        <a:lnSpc>
+                          <a:spcPct val="115000"/>
+                        </a:lnSpc>
+                        <a:spcAft>
+                          <a:spcPts val="0"/>
+                        </a:spcAft>
+                      </a:pPr>
+                      <a:r>
+                        <a:rPr lang="es-ES" sz="1200">
+                          <a:effectLst/>
+                        </a:rPr>
+                        <a:t>GS</a:t>
+                      </a:r>
+                      <a:endParaRPr lang="es-AR" sz="1100">
+                        <a:effectLst/>
+                        <a:latin typeface="Calibri" panose="020F0502020204030204" pitchFamily="34" charset="0"/>
+                        <a:ea typeface="Times New Roman" panose="02020603050405020304" pitchFamily="18" charset="0"/>
+                        <a:cs typeface="Times New Roman" panose="02020603050405020304" pitchFamily="18" charset="0"/>
+                      </a:endParaRPr>
+                    </a:p>
+                  </a:txBody>
+                  <a:tcPr marL="68580" marR="68580" marT="0" marB="0"/>
+                </a:tc>
+                <a:tc>
+                  <a:txBody>
+                    <a:bodyPr/>
+                    <a:lstStyle/>
+                    <a:p>
+                      <a:pPr algn="just">
+                        <a:lnSpc>
+                          <a:spcPct val="115000"/>
+                        </a:lnSpc>
+                        <a:spcAft>
+                          <a:spcPts val="0"/>
+                        </a:spcAft>
+                      </a:pPr>
+                      <a:r>
+                        <a:rPr lang="es-ES" sz="1200">
+                          <a:effectLst/>
+                        </a:rPr>
+                        <a:t>kWh</a:t>
+                      </a:r>
+                      <a:endParaRPr lang="es-AR" sz="1100">
+                        <a:effectLst/>
+                        <a:latin typeface="Calibri" panose="020F0502020204030204" pitchFamily="34" charset="0"/>
+                        <a:ea typeface="Times New Roman" panose="02020603050405020304" pitchFamily="18" charset="0"/>
+                        <a:cs typeface="Times New Roman" panose="02020603050405020304" pitchFamily="18" charset="0"/>
+                      </a:endParaRPr>
+                    </a:p>
+                  </a:txBody>
+                  <a:tcPr marL="68580" marR="68580" marT="0" marB="0"/>
+                </a:tc>
+                <a:tc>
+                  <a:txBody>
+                    <a:bodyPr/>
+                    <a:lstStyle/>
+                    <a:p>
+                      <a:pPr algn="just">
+                        <a:lnSpc>
+                          <a:spcPct val="115000"/>
+                        </a:lnSpc>
+                        <a:spcAft>
+                          <a:spcPts val="0"/>
+                        </a:spcAft>
+                      </a:pPr>
+                      <a:r>
+                        <a:rPr lang="es-ES" sz="1200">
+                          <a:effectLst/>
+                        </a:rPr>
+                        <a:t>0,2017</a:t>
+                      </a:r>
+                      <a:endParaRPr lang="es-AR" sz="1100">
+                        <a:effectLst/>
+                        <a:latin typeface="Calibri" panose="020F0502020204030204" pitchFamily="34" charset="0"/>
+                        <a:ea typeface="Times New Roman" panose="02020603050405020304" pitchFamily="18" charset="0"/>
+                        <a:cs typeface="Times New Roman" panose="02020603050405020304" pitchFamily="18" charset="0"/>
+                      </a:endParaRPr>
+                    </a:p>
+                  </a:txBody>
+                  <a:tcPr marL="68580" marR="68580" marT="0" marB="0"/>
+                </a:tc>
+                <a:extLst>
+                  <a:ext uri="{0D108BD9-81ED-4DB2-BD59-A6C34878D82A}">
+                    <a16:rowId xmlns:a16="http://schemas.microsoft.com/office/drawing/2014/main" val="4184870459"/>
+                  </a:ext>
+                </a:extLst>
+              </a:tr>
+              <a:tr h="366019">
+                <a:tc>
+                  <a:txBody>
+                    <a:bodyPr/>
+                    <a:lstStyle/>
+                    <a:p>
+                      <a:pPr algn="just">
+                        <a:lnSpc>
+                          <a:spcPct val="115000"/>
+                        </a:lnSpc>
+                        <a:spcAft>
+                          <a:spcPts val="0"/>
+                        </a:spcAft>
+                      </a:pPr>
+                      <a:r>
+                        <a:rPr lang="es-ES" sz="1200">
+                          <a:effectLst/>
+                        </a:rPr>
+                        <a:t>Gas Propano</a:t>
+                      </a:r>
+                      <a:endParaRPr lang="es-AR" sz="1100">
+                        <a:effectLst/>
+                        <a:latin typeface="Calibri" panose="020F0502020204030204" pitchFamily="34" charset="0"/>
+                        <a:ea typeface="Times New Roman" panose="02020603050405020304" pitchFamily="18" charset="0"/>
+                        <a:cs typeface="Times New Roman" panose="02020603050405020304" pitchFamily="18" charset="0"/>
+                      </a:endParaRPr>
+                    </a:p>
+                  </a:txBody>
+                  <a:tcPr marL="68580" marR="68580" marT="0" marB="0"/>
+                </a:tc>
+                <a:tc>
+                  <a:txBody>
+                    <a:bodyPr/>
+                    <a:lstStyle/>
+                    <a:p>
+                      <a:pPr algn="just">
+                        <a:lnSpc>
+                          <a:spcPct val="115000"/>
+                        </a:lnSpc>
+                        <a:spcAft>
+                          <a:spcPts val="0"/>
+                        </a:spcAft>
+                      </a:pPr>
+                      <a:r>
+                        <a:rPr lang="es-ES" sz="1200">
+                          <a:effectLst/>
+                        </a:rPr>
+                        <a:t>GP</a:t>
+                      </a:r>
+                      <a:endParaRPr lang="es-AR" sz="1100">
+                        <a:effectLst/>
+                        <a:latin typeface="Calibri" panose="020F0502020204030204" pitchFamily="34" charset="0"/>
+                        <a:ea typeface="Times New Roman" panose="02020603050405020304" pitchFamily="18" charset="0"/>
+                        <a:cs typeface="Times New Roman" panose="02020603050405020304" pitchFamily="18" charset="0"/>
+                      </a:endParaRPr>
+                    </a:p>
+                  </a:txBody>
+                  <a:tcPr marL="68580" marR="68580" marT="0" marB="0"/>
+                </a:tc>
+                <a:tc>
+                  <a:txBody>
+                    <a:bodyPr/>
+                    <a:lstStyle/>
+                    <a:p>
+                      <a:pPr algn="just">
+                        <a:lnSpc>
+                          <a:spcPct val="115000"/>
+                        </a:lnSpc>
+                        <a:spcAft>
+                          <a:spcPts val="0"/>
+                        </a:spcAft>
+                      </a:pPr>
+                      <a:r>
+                        <a:rPr lang="es-ES" sz="1200" dirty="0" err="1">
+                          <a:effectLst/>
+                        </a:rPr>
+                        <a:t>kWh</a:t>
+                      </a:r>
+                      <a:endParaRPr lang="es-AR" sz="1100" dirty="0">
+                        <a:effectLst/>
+                        <a:latin typeface="Calibri" panose="020F0502020204030204" pitchFamily="34" charset="0"/>
+                        <a:ea typeface="Times New Roman" panose="02020603050405020304" pitchFamily="18" charset="0"/>
+                        <a:cs typeface="Times New Roman" panose="02020603050405020304" pitchFamily="18" charset="0"/>
+                      </a:endParaRPr>
+                    </a:p>
+                  </a:txBody>
+                  <a:tcPr marL="68580" marR="68580" marT="0" marB="0"/>
+                </a:tc>
+                <a:tc>
+                  <a:txBody>
+                    <a:bodyPr/>
+                    <a:lstStyle/>
+                    <a:p>
+                      <a:pPr algn="just">
+                        <a:lnSpc>
+                          <a:spcPct val="115000"/>
+                        </a:lnSpc>
+                        <a:spcAft>
+                          <a:spcPts val="0"/>
+                        </a:spcAft>
+                      </a:pPr>
+                      <a:r>
+                        <a:rPr lang="es-ES" sz="1200">
+                          <a:effectLst/>
+                        </a:rPr>
+                        <a:t>0,2297</a:t>
+                      </a:r>
+                      <a:endParaRPr lang="es-AR" sz="1100">
+                        <a:effectLst/>
+                        <a:latin typeface="Calibri" panose="020F0502020204030204" pitchFamily="34" charset="0"/>
+                        <a:ea typeface="Times New Roman" panose="02020603050405020304" pitchFamily="18" charset="0"/>
+                        <a:cs typeface="Times New Roman" panose="02020603050405020304" pitchFamily="18" charset="0"/>
+                      </a:endParaRPr>
+                    </a:p>
+                  </a:txBody>
+                  <a:tcPr marL="68580" marR="68580" marT="0" marB="0"/>
+                </a:tc>
+                <a:extLst>
+                  <a:ext uri="{0D108BD9-81ED-4DB2-BD59-A6C34878D82A}">
+                    <a16:rowId xmlns:a16="http://schemas.microsoft.com/office/drawing/2014/main" val="3815099796"/>
+                  </a:ext>
+                </a:extLst>
+              </a:tr>
+              <a:tr h="366019">
+                <a:tc>
+                  <a:txBody>
+                    <a:bodyPr/>
+                    <a:lstStyle/>
+                    <a:p>
+                      <a:pPr algn="just">
+                        <a:lnSpc>
+                          <a:spcPct val="115000"/>
+                        </a:lnSpc>
+                        <a:spcAft>
+                          <a:spcPts val="0"/>
+                        </a:spcAft>
+                      </a:pPr>
+                      <a:r>
+                        <a:rPr lang="es-ES" sz="1200">
+                          <a:effectLst/>
+                        </a:rPr>
+                        <a:t>Gasoil</a:t>
+                      </a:r>
+                      <a:endParaRPr lang="es-AR" sz="1100">
+                        <a:effectLst/>
+                        <a:latin typeface="Calibri" panose="020F0502020204030204" pitchFamily="34" charset="0"/>
+                        <a:ea typeface="Times New Roman" panose="02020603050405020304" pitchFamily="18" charset="0"/>
+                        <a:cs typeface="Times New Roman" panose="02020603050405020304" pitchFamily="18" charset="0"/>
+                      </a:endParaRPr>
+                    </a:p>
+                  </a:txBody>
+                  <a:tcPr marL="68580" marR="68580" marT="0" marB="0"/>
+                </a:tc>
+                <a:tc>
+                  <a:txBody>
+                    <a:bodyPr/>
+                    <a:lstStyle/>
+                    <a:p>
+                      <a:pPr algn="just">
+                        <a:lnSpc>
+                          <a:spcPct val="115000"/>
+                        </a:lnSpc>
+                        <a:spcAft>
+                          <a:spcPts val="0"/>
+                        </a:spcAft>
+                      </a:pPr>
+                      <a:r>
+                        <a:rPr lang="es-ES" sz="1200" dirty="0">
+                          <a:effectLst/>
+                        </a:rPr>
+                        <a:t>G</a:t>
+                      </a:r>
+                      <a:endParaRPr lang="es-AR" sz="1100" dirty="0">
+                        <a:effectLst/>
+                        <a:latin typeface="Calibri" panose="020F0502020204030204" pitchFamily="34" charset="0"/>
+                        <a:ea typeface="Times New Roman" panose="02020603050405020304" pitchFamily="18" charset="0"/>
+                        <a:cs typeface="Times New Roman" panose="02020603050405020304" pitchFamily="18" charset="0"/>
+                      </a:endParaRPr>
+                    </a:p>
+                  </a:txBody>
+                  <a:tcPr marL="68580" marR="68580" marT="0" marB="0"/>
+                </a:tc>
+                <a:tc>
+                  <a:txBody>
+                    <a:bodyPr/>
+                    <a:lstStyle/>
+                    <a:p>
+                      <a:pPr algn="just">
+                        <a:lnSpc>
+                          <a:spcPct val="115000"/>
+                        </a:lnSpc>
+                        <a:spcAft>
+                          <a:spcPts val="0"/>
+                        </a:spcAft>
+                      </a:pPr>
+                      <a:r>
+                        <a:rPr lang="es-ES" sz="1200">
+                          <a:effectLst/>
+                        </a:rPr>
+                        <a:t>l</a:t>
+                      </a:r>
+                      <a:endParaRPr lang="es-AR" sz="1100">
+                        <a:effectLst/>
+                        <a:latin typeface="Calibri" panose="020F0502020204030204" pitchFamily="34" charset="0"/>
+                        <a:ea typeface="Times New Roman" panose="02020603050405020304" pitchFamily="18" charset="0"/>
+                        <a:cs typeface="Times New Roman" panose="02020603050405020304" pitchFamily="18" charset="0"/>
+                      </a:endParaRPr>
+                    </a:p>
+                  </a:txBody>
+                  <a:tcPr marL="68580" marR="68580" marT="0" marB="0"/>
+                </a:tc>
+                <a:tc>
+                  <a:txBody>
+                    <a:bodyPr/>
+                    <a:lstStyle/>
+                    <a:p>
+                      <a:pPr algn="just">
+                        <a:lnSpc>
+                          <a:spcPct val="115000"/>
+                        </a:lnSpc>
+                        <a:spcAft>
+                          <a:spcPts val="0"/>
+                        </a:spcAft>
+                      </a:pPr>
+                      <a:r>
+                        <a:rPr lang="es-ES" sz="1200">
+                          <a:effectLst/>
+                        </a:rPr>
+                        <a:t>0,2628</a:t>
+                      </a:r>
+                      <a:endParaRPr lang="es-AR" sz="1100">
+                        <a:effectLst/>
+                        <a:latin typeface="Calibri" panose="020F0502020204030204" pitchFamily="34" charset="0"/>
+                        <a:ea typeface="Times New Roman" panose="02020603050405020304" pitchFamily="18" charset="0"/>
+                        <a:cs typeface="Times New Roman" panose="02020603050405020304" pitchFamily="18" charset="0"/>
+                      </a:endParaRPr>
+                    </a:p>
+                  </a:txBody>
+                  <a:tcPr marL="68580" marR="68580" marT="0" marB="0"/>
+                </a:tc>
+                <a:extLst>
+                  <a:ext uri="{0D108BD9-81ED-4DB2-BD59-A6C34878D82A}">
+                    <a16:rowId xmlns:a16="http://schemas.microsoft.com/office/drawing/2014/main" val="1288730025"/>
+                  </a:ext>
+                </a:extLst>
+              </a:tr>
+              <a:tr h="366019">
+                <a:tc>
+                  <a:txBody>
+                    <a:bodyPr/>
+                    <a:lstStyle/>
+                    <a:p>
+                      <a:pPr algn="just">
+                        <a:lnSpc>
+                          <a:spcPct val="115000"/>
+                        </a:lnSpc>
+                        <a:spcAft>
+                          <a:spcPts val="0"/>
+                        </a:spcAft>
+                      </a:pPr>
+                      <a:r>
+                        <a:rPr lang="es-ES" sz="1200" dirty="0">
+                          <a:effectLst/>
+                        </a:rPr>
+                        <a:t>Nafta</a:t>
+                      </a:r>
+                      <a:endParaRPr lang="es-AR" sz="1100" dirty="0">
+                        <a:effectLst/>
+                        <a:latin typeface="Calibri" panose="020F0502020204030204" pitchFamily="34" charset="0"/>
+                        <a:ea typeface="Times New Roman" panose="02020603050405020304" pitchFamily="18" charset="0"/>
+                        <a:cs typeface="Times New Roman" panose="02020603050405020304" pitchFamily="18" charset="0"/>
+                      </a:endParaRPr>
+                    </a:p>
+                  </a:txBody>
+                  <a:tcPr marL="68580" marR="68580" marT="0" marB="0"/>
+                </a:tc>
+                <a:tc>
+                  <a:txBody>
+                    <a:bodyPr/>
+                    <a:lstStyle/>
+                    <a:p>
+                      <a:pPr algn="just">
+                        <a:lnSpc>
+                          <a:spcPct val="115000"/>
+                        </a:lnSpc>
+                        <a:spcAft>
+                          <a:spcPts val="0"/>
+                        </a:spcAft>
+                      </a:pPr>
+                      <a:r>
+                        <a:rPr lang="es-ES" sz="1200">
+                          <a:effectLst/>
+                        </a:rPr>
+                        <a:t>N</a:t>
+                      </a:r>
+                      <a:endParaRPr lang="es-AR" sz="1100">
+                        <a:effectLst/>
+                        <a:latin typeface="Calibri" panose="020F0502020204030204" pitchFamily="34" charset="0"/>
+                        <a:ea typeface="Times New Roman" panose="02020603050405020304" pitchFamily="18" charset="0"/>
+                        <a:cs typeface="Times New Roman" panose="02020603050405020304" pitchFamily="18" charset="0"/>
+                      </a:endParaRPr>
+                    </a:p>
+                  </a:txBody>
+                  <a:tcPr marL="68580" marR="68580" marT="0" marB="0"/>
+                </a:tc>
+                <a:tc>
+                  <a:txBody>
+                    <a:bodyPr/>
+                    <a:lstStyle/>
+                    <a:p>
+                      <a:pPr algn="just">
+                        <a:lnSpc>
+                          <a:spcPct val="115000"/>
+                        </a:lnSpc>
+                        <a:spcAft>
+                          <a:spcPts val="0"/>
+                        </a:spcAft>
+                      </a:pPr>
+                      <a:r>
+                        <a:rPr lang="es-ES" sz="1200">
+                          <a:effectLst/>
+                        </a:rPr>
+                        <a:t>l</a:t>
+                      </a:r>
+                      <a:endParaRPr lang="es-AR" sz="1100">
+                        <a:effectLst/>
+                        <a:latin typeface="Calibri" panose="020F0502020204030204" pitchFamily="34" charset="0"/>
+                        <a:ea typeface="Times New Roman" panose="02020603050405020304" pitchFamily="18" charset="0"/>
+                        <a:cs typeface="Times New Roman" panose="02020603050405020304" pitchFamily="18" charset="0"/>
+                      </a:endParaRPr>
+                    </a:p>
+                  </a:txBody>
+                  <a:tcPr marL="68580" marR="68580" marT="0" marB="0"/>
+                </a:tc>
+                <a:tc>
+                  <a:txBody>
+                    <a:bodyPr/>
+                    <a:lstStyle/>
+                    <a:p>
+                      <a:pPr algn="just">
+                        <a:lnSpc>
+                          <a:spcPct val="115000"/>
+                        </a:lnSpc>
+                        <a:spcAft>
+                          <a:spcPts val="0"/>
+                        </a:spcAft>
+                      </a:pPr>
+                      <a:r>
+                        <a:rPr lang="es-ES" sz="1200">
+                          <a:effectLst/>
+                        </a:rPr>
+                        <a:t>0,2340</a:t>
+                      </a:r>
+                      <a:endParaRPr lang="es-AR" sz="1100">
+                        <a:effectLst/>
+                        <a:latin typeface="Calibri" panose="020F0502020204030204" pitchFamily="34" charset="0"/>
+                        <a:ea typeface="Times New Roman" panose="02020603050405020304" pitchFamily="18" charset="0"/>
+                        <a:cs typeface="Times New Roman" panose="02020603050405020304" pitchFamily="18" charset="0"/>
+                      </a:endParaRPr>
+                    </a:p>
+                  </a:txBody>
+                  <a:tcPr marL="68580" marR="68580" marT="0" marB="0"/>
+                </a:tc>
+                <a:extLst>
+                  <a:ext uri="{0D108BD9-81ED-4DB2-BD59-A6C34878D82A}">
+                    <a16:rowId xmlns:a16="http://schemas.microsoft.com/office/drawing/2014/main" val="4061447296"/>
+                  </a:ext>
+                </a:extLst>
+              </a:tr>
+              <a:tr h="322906">
+                <a:tc>
+                  <a:txBody>
+                    <a:bodyPr/>
+                    <a:lstStyle/>
+                    <a:p>
+                      <a:pPr algn="just">
+                        <a:lnSpc>
+                          <a:spcPct val="115000"/>
+                        </a:lnSpc>
+                        <a:spcAft>
+                          <a:spcPts val="0"/>
+                        </a:spcAft>
+                      </a:pPr>
+                      <a:r>
+                        <a:rPr lang="es-ES" sz="1200">
+                          <a:effectLst/>
+                        </a:rPr>
+                        <a:t>Electricidad</a:t>
+                      </a:r>
+                      <a:endParaRPr lang="es-AR" sz="1100">
+                        <a:effectLst/>
+                        <a:latin typeface="Calibri" panose="020F0502020204030204" pitchFamily="34" charset="0"/>
+                        <a:ea typeface="Times New Roman" panose="02020603050405020304" pitchFamily="18" charset="0"/>
+                        <a:cs typeface="Times New Roman" panose="02020603050405020304" pitchFamily="18" charset="0"/>
+                      </a:endParaRPr>
+                    </a:p>
+                  </a:txBody>
+                  <a:tcPr marL="68580" marR="68580" marT="0" marB="0"/>
+                </a:tc>
+                <a:tc>
+                  <a:txBody>
+                    <a:bodyPr/>
+                    <a:lstStyle/>
+                    <a:p>
+                      <a:pPr algn="just">
+                        <a:lnSpc>
+                          <a:spcPct val="115000"/>
+                        </a:lnSpc>
+                        <a:spcAft>
+                          <a:spcPts val="0"/>
+                        </a:spcAft>
+                      </a:pPr>
+                      <a:r>
+                        <a:rPr lang="es-ES" sz="1200" dirty="0">
+                          <a:effectLst/>
+                        </a:rPr>
+                        <a:t>E</a:t>
+                      </a:r>
+                      <a:endParaRPr lang="es-AR" sz="1100" dirty="0">
+                        <a:effectLst/>
+                        <a:latin typeface="Calibri" panose="020F0502020204030204" pitchFamily="34" charset="0"/>
+                        <a:ea typeface="Times New Roman" panose="02020603050405020304" pitchFamily="18" charset="0"/>
+                        <a:cs typeface="Times New Roman" panose="02020603050405020304" pitchFamily="18" charset="0"/>
+                      </a:endParaRPr>
+                    </a:p>
+                  </a:txBody>
+                  <a:tcPr marL="68580" marR="68580" marT="0" marB="0"/>
+                </a:tc>
+                <a:tc>
+                  <a:txBody>
+                    <a:bodyPr/>
+                    <a:lstStyle/>
+                    <a:p>
+                      <a:pPr algn="just">
+                        <a:lnSpc>
+                          <a:spcPct val="115000"/>
+                        </a:lnSpc>
+                        <a:spcAft>
+                          <a:spcPts val="0"/>
+                        </a:spcAft>
+                      </a:pPr>
+                      <a:r>
+                        <a:rPr lang="es-ES" sz="1200">
+                          <a:effectLst/>
+                        </a:rPr>
+                        <a:t>kWh</a:t>
+                      </a:r>
+                      <a:endParaRPr lang="es-AR" sz="1100">
+                        <a:effectLst/>
+                        <a:latin typeface="Calibri" panose="020F0502020204030204" pitchFamily="34" charset="0"/>
+                        <a:ea typeface="Times New Roman" panose="02020603050405020304" pitchFamily="18" charset="0"/>
+                        <a:cs typeface="Times New Roman" panose="02020603050405020304" pitchFamily="18" charset="0"/>
+                      </a:endParaRPr>
+                    </a:p>
+                  </a:txBody>
+                  <a:tcPr marL="68580" marR="68580" marT="0" marB="0"/>
+                </a:tc>
+                <a:tc>
+                  <a:txBody>
+                    <a:bodyPr/>
+                    <a:lstStyle/>
+                    <a:p>
+                      <a:pPr algn="just">
+                        <a:lnSpc>
+                          <a:spcPct val="115000"/>
+                        </a:lnSpc>
+                        <a:spcAft>
+                          <a:spcPts val="0"/>
+                        </a:spcAft>
+                      </a:pPr>
+                      <a:r>
+                        <a:rPr lang="es-ES" sz="1200" dirty="0">
+                          <a:effectLst/>
+                        </a:rPr>
+                        <a:t>0,385</a:t>
+                      </a:r>
+                      <a:endParaRPr lang="es-AR" sz="1100" dirty="0">
+                        <a:effectLst/>
+                        <a:latin typeface="Calibri" panose="020F0502020204030204" pitchFamily="34" charset="0"/>
+                        <a:ea typeface="Times New Roman" panose="02020603050405020304" pitchFamily="18" charset="0"/>
+                        <a:cs typeface="Times New Roman" panose="02020603050405020304" pitchFamily="18" charset="0"/>
+                      </a:endParaRPr>
+                    </a:p>
+                  </a:txBody>
+                  <a:tcPr marL="68580" marR="68580" marT="0" marB="0"/>
+                </a:tc>
+                <a:extLst>
+                  <a:ext uri="{0D108BD9-81ED-4DB2-BD59-A6C34878D82A}">
+                    <a16:rowId xmlns:a16="http://schemas.microsoft.com/office/drawing/2014/main" val="3410270351"/>
+                  </a:ext>
+                </a:extLst>
+              </a:tr>
+            </a:tbl>
+          </a:graphicData>
+        </a:graphic>
+      </p:graphicFrame>
+      <p:sp>
+        <p:nvSpPr>
+          <p:cNvPr id="7" name="Content Placeholder 2"/>
+          <p:cNvSpPr txBox="1">
+            <a:spLocks/>
+          </p:cNvSpPr>
+          <p:nvPr/>
+        </p:nvSpPr>
+        <p:spPr>
+          <a:xfrm>
+            <a:off x="1285649" y="1404636"/>
+            <a:ext cx="6777696" cy="1677198"/>
+          </a:xfrm>
+          <a:prstGeom prst="rect">
+            <a:avLst/>
+          </a:prstGeom>
+        </p:spPr>
+        <p:txBody>
+          <a:bodyPr vert="horz" lIns="91440" tIns="45720" rIns="91440" bIns="45720" rtlCol="0" anchor="ctr">
+            <a:normAutofit/>
+          </a:bodyPr>
+          <a:lstStyle>
+            <a:lvl1pPr marL="285750" indent="-285750" algn="l" defTabSz="457200" rtl="0" eaLnBrk="1" latinLnBrk="0" hangingPunct="1">
+              <a:spcBef>
+                <a:spcPct val="20000"/>
+              </a:spcBef>
+              <a:spcAft>
+                <a:spcPts val="600"/>
+              </a:spcAft>
+              <a:buClr>
+                <a:schemeClr val="accent1">
+                  <a:lumMod val="75000"/>
+                </a:schemeClr>
+              </a:buClr>
+              <a:buSzPct val="145000"/>
+              <a:buFont typeface="Arial"/>
+              <a:buChar char="•"/>
+              <a:defRPr sz="2400" kern="1200" cap="none">
+                <a:solidFill>
+                  <a:schemeClr val="tx1"/>
+                </a:solidFill>
+                <a:effectLst/>
+                <a:latin typeface="+mn-lt"/>
+                <a:ea typeface="+mn-ea"/>
+                <a:cs typeface="+mn-cs"/>
+              </a:defRPr>
+            </a:lvl1pPr>
+            <a:lvl2pPr marL="742950" indent="-285750" algn="l" defTabSz="457200" rtl="0" eaLnBrk="1" latinLnBrk="0" hangingPunct="1">
+              <a:spcBef>
+                <a:spcPct val="20000"/>
+              </a:spcBef>
+              <a:spcAft>
+                <a:spcPts val="600"/>
+              </a:spcAft>
+              <a:buClr>
+                <a:schemeClr val="accent1">
+                  <a:lumMod val="75000"/>
+                </a:schemeClr>
+              </a:buClr>
+              <a:buSzPct val="145000"/>
+              <a:buFont typeface="Arial"/>
+              <a:buChar char="•"/>
+              <a:defRPr sz="2000" kern="1200" cap="none">
+                <a:solidFill>
+                  <a:schemeClr val="tx1"/>
+                </a:solidFill>
+                <a:effectLst/>
+                <a:latin typeface="+mn-lt"/>
+                <a:ea typeface="+mn-ea"/>
+                <a:cs typeface="+mn-cs"/>
+              </a:defRPr>
+            </a:lvl2pPr>
+            <a:lvl3pPr marL="1200150" indent="-285750" algn="l" defTabSz="457200" rtl="0" eaLnBrk="1" latinLnBrk="0" hangingPunct="1">
+              <a:spcBef>
+                <a:spcPct val="20000"/>
+              </a:spcBef>
+              <a:spcAft>
+                <a:spcPts val="600"/>
+              </a:spcAft>
+              <a:buClr>
+                <a:schemeClr val="accent1">
+                  <a:lumMod val="75000"/>
+                </a:schemeClr>
+              </a:buClr>
+              <a:buSzPct val="145000"/>
+              <a:buFont typeface="Arial"/>
+              <a:buChar char="•"/>
+              <a:defRPr sz="1800" kern="1200" cap="none">
+                <a:solidFill>
+                  <a:schemeClr val="tx1"/>
+                </a:solidFill>
+                <a:effectLst/>
+                <a:latin typeface="+mn-lt"/>
+                <a:ea typeface="+mn-ea"/>
+                <a:cs typeface="+mn-cs"/>
+              </a:defRPr>
+            </a:lvl3pPr>
+            <a:lvl4pPr marL="1543050" indent="-171450" algn="l" defTabSz="457200" rtl="0" eaLnBrk="1" latinLnBrk="0" hangingPunct="1">
+              <a:spcBef>
+                <a:spcPct val="20000"/>
+              </a:spcBef>
+              <a:spcAft>
+                <a:spcPts val="600"/>
+              </a:spcAft>
+              <a:buClr>
+                <a:schemeClr val="accent1">
+                  <a:lumMod val="75000"/>
+                </a:schemeClr>
+              </a:buClr>
+              <a:buSzPct val="145000"/>
+              <a:buFont typeface="Arial"/>
+              <a:buChar char="•"/>
+              <a:defRPr sz="1600" kern="1200" cap="none">
+                <a:solidFill>
+                  <a:schemeClr val="tx1"/>
+                </a:solidFill>
+                <a:effectLst/>
+                <a:latin typeface="+mn-lt"/>
+                <a:ea typeface="+mn-ea"/>
+                <a:cs typeface="+mn-cs"/>
+              </a:defRPr>
+            </a:lvl4pPr>
+            <a:lvl5pPr marL="2000250" indent="-171450" algn="l" defTabSz="457200" rtl="0" eaLnBrk="1" latinLnBrk="0" hangingPunct="1">
+              <a:spcBef>
+                <a:spcPct val="20000"/>
+              </a:spcBef>
+              <a:spcAft>
+                <a:spcPts val="600"/>
+              </a:spcAft>
+              <a:buClr>
+                <a:schemeClr val="accent1">
+                  <a:lumMod val="75000"/>
+                </a:schemeClr>
+              </a:buClr>
+              <a:buSzPct val="145000"/>
+              <a:buFont typeface="Arial"/>
+              <a:buChar char="•"/>
+              <a:defRPr sz="1400" kern="1200" cap="none">
+                <a:solidFill>
+                  <a:schemeClr val="tx1"/>
+                </a:solidFill>
+                <a:effectLst/>
+                <a:latin typeface="+mn-lt"/>
+                <a:ea typeface="+mn-ea"/>
+                <a:cs typeface="+mn-cs"/>
+              </a:defRPr>
+            </a:lvl5pPr>
+            <a:lvl6pPr marL="2514600" indent="-228600" algn="l" defTabSz="457200" rtl="0" eaLnBrk="1" latinLnBrk="0" hangingPunct="1">
+              <a:spcBef>
+                <a:spcPct val="20000"/>
+              </a:spcBef>
+              <a:spcAft>
+                <a:spcPts val="600"/>
+              </a:spcAft>
+              <a:buClr>
+                <a:schemeClr val="accent1">
+                  <a:lumMod val="75000"/>
+                </a:schemeClr>
+              </a:buClr>
+              <a:buSzPct val="145000"/>
+              <a:buFont typeface="Arial"/>
+              <a:buChar char="•"/>
+              <a:defRPr sz="1400" kern="1200" cap="none">
+                <a:solidFill>
+                  <a:schemeClr val="tx1"/>
+                </a:solidFill>
+                <a:effectLst/>
+                <a:latin typeface="+mn-lt"/>
+                <a:ea typeface="+mn-ea"/>
+                <a:cs typeface="+mn-cs"/>
+              </a:defRPr>
+            </a:lvl6pPr>
+            <a:lvl7pPr marL="2971800" indent="-228600" algn="l" defTabSz="457200" rtl="0" eaLnBrk="1" latinLnBrk="0" hangingPunct="1">
+              <a:spcBef>
+                <a:spcPct val="20000"/>
+              </a:spcBef>
+              <a:spcAft>
+                <a:spcPts val="600"/>
+              </a:spcAft>
+              <a:buClr>
+                <a:schemeClr val="accent1">
+                  <a:lumMod val="75000"/>
+                </a:schemeClr>
+              </a:buClr>
+              <a:buSzPct val="145000"/>
+              <a:buFont typeface="Arial"/>
+              <a:buChar char="•"/>
+              <a:defRPr sz="1400" kern="1200" cap="none">
+                <a:solidFill>
+                  <a:schemeClr val="tx1"/>
+                </a:solidFill>
+                <a:effectLst/>
+                <a:latin typeface="+mn-lt"/>
+                <a:ea typeface="+mn-ea"/>
+                <a:cs typeface="+mn-cs"/>
+              </a:defRPr>
+            </a:lvl7pPr>
+            <a:lvl8pPr marL="3429000" indent="-228600" algn="l" defTabSz="457200" rtl="0" eaLnBrk="1" latinLnBrk="0" hangingPunct="1">
+              <a:spcBef>
+                <a:spcPct val="20000"/>
+              </a:spcBef>
+              <a:spcAft>
+                <a:spcPts val="600"/>
+              </a:spcAft>
+              <a:buClr>
+                <a:schemeClr val="accent1">
+                  <a:lumMod val="75000"/>
+                </a:schemeClr>
+              </a:buClr>
+              <a:buSzPct val="145000"/>
+              <a:buFont typeface="Arial"/>
+              <a:buChar char="•"/>
+              <a:defRPr sz="1400" kern="1200" cap="none">
+                <a:solidFill>
+                  <a:schemeClr val="tx1"/>
+                </a:solidFill>
+                <a:effectLst/>
+                <a:latin typeface="+mn-lt"/>
+                <a:ea typeface="+mn-ea"/>
+                <a:cs typeface="+mn-cs"/>
+              </a:defRPr>
+            </a:lvl8pPr>
+            <a:lvl9pPr marL="3886200" indent="-228600" algn="l" defTabSz="457200" rtl="0" eaLnBrk="1" latinLnBrk="0" hangingPunct="1">
+              <a:spcBef>
+                <a:spcPct val="20000"/>
+              </a:spcBef>
+              <a:spcAft>
+                <a:spcPts val="600"/>
+              </a:spcAft>
+              <a:buClr>
+                <a:schemeClr val="accent1">
+                  <a:lumMod val="75000"/>
+                </a:schemeClr>
+              </a:buClr>
+              <a:buSzPct val="145000"/>
+              <a:buFont typeface="Arial"/>
+              <a:buChar char="•"/>
+              <a:defRPr sz="1400" kern="1200" cap="none">
+                <a:solidFill>
+                  <a:schemeClr val="tx1"/>
+                </a:solidFill>
+                <a:effectLst/>
+                <a:latin typeface="+mn-lt"/>
+                <a:ea typeface="+mn-ea"/>
+                <a:cs typeface="+mn-cs"/>
+              </a:defRPr>
+            </a:lvl9pPr>
+          </a:lstStyle>
+          <a:p>
+            <a:r>
+              <a:rPr lang="es-ES" dirty="0">
+                <a:latin typeface="Calibri" panose="020F0502020204030204" pitchFamily="34" charset="0"/>
+                <a:cs typeface="Calibri" panose="020F0502020204030204" pitchFamily="34" charset="0"/>
+              </a:rPr>
+              <a:t>Los combustibles usados en el calculo y el factor de emisión que influye en el índice de medición final de la “huella de carbono”</a:t>
+            </a:r>
+            <a:endParaRPr lang="es-AR" dirty="0">
+              <a:latin typeface="Calibri" panose="020F0502020204030204" pitchFamily="34" charset="0"/>
+              <a:cs typeface="Calibri" panose="020F0502020204030204" pitchFamily="34" charset="0"/>
+            </a:endParaRPr>
+          </a:p>
+          <a:p>
+            <a:endParaRPr lang="es-ES" dirty="0">
+              <a:latin typeface="Calibri" panose="020F0502020204030204" pitchFamily="34" charset="0"/>
+              <a:cs typeface="Calibri" panose="020F0502020204030204" pitchFamily="34" charset="0"/>
+            </a:endParaRPr>
+          </a:p>
+        </p:txBody>
+      </p:sp>
+    </p:spTree>
+    <p:extLst>
+      <p:ext uri="{BB962C8B-B14F-4D97-AF65-F5344CB8AC3E}">
+        <p14:creationId xmlns:p14="http://schemas.microsoft.com/office/powerpoint/2010/main" val="4241039465"/>
+      </p:ext>
+    </p:extLst>
+  </p:cSld>
+  <p:clrMapOvr>
+    <a:masterClrMapping/>
+  </p:clrMapOvr>
+</p:sld>
+</file>
+
+<file path=ppt/slides/slide7.xml><?xml version="1.0" encoding="utf-8"?>
+<p:sld xmlns:a="http://schemas.openxmlformats.org/drawingml/2006/main" xmlns:r="http://schemas.openxmlformats.org/officeDocument/2006/relationships" xmlns:p="http://schemas.openxmlformats.org/presentationml/2006/main">
+  <p:cSld>
+    <p:spTree>
+      <p:nvGrpSpPr>
+        <p:cNvPr id="1" name=""/>
+        <p:cNvGrpSpPr/>
+        <p:nvPr/>
+      </p:nvGrpSpPr>
+      <p:grpSpPr>
+        <a:xfrm>
+          <a:off x="0" y="0"/>
+          <a:ext cx="0" cy="0"/>
+          <a:chOff x="0" y="0"/>
+          <a:chExt cx="0" cy="0"/>
+        </a:xfrm>
+      </p:grpSpPr>
+      <p:sp>
+        <p:nvSpPr>
+          <p:cNvPr id="5" name="Content Placeholder 2"/>
+          <p:cNvSpPr txBox="1">
+            <a:spLocks/>
+          </p:cNvSpPr>
+          <p:nvPr/>
+        </p:nvSpPr>
+        <p:spPr>
+          <a:xfrm>
+            <a:off x="1080655" y="1607128"/>
+            <a:ext cx="8714509" cy="4433454"/>
+          </a:xfrm>
+          <a:prstGeom prst="rect">
+            <a:avLst/>
+          </a:prstGeom>
+        </p:spPr>
+        <p:txBody>
+          <a:bodyPr vert="horz" lIns="91440" tIns="45720" rIns="91440" bIns="45720" rtlCol="0" anchor="ctr">
+            <a:normAutofit/>
+          </a:bodyPr>
+          <a:lstStyle>
+            <a:lvl1pPr marL="285750" indent="-285750" algn="l" defTabSz="457200" rtl="0" eaLnBrk="1" latinLnBrk="0" hangingPunct="1">
+              <a:spcBef>
+                <a:spcPct val="20000"/>
+              </a:spcBef>
+              <a:spcAft>
+                <a:spcPts val="600"/>
+              </a:spcAft>
+              <a:buClr>
+                <a:schemeClr val="accent1">
+                  <a:lumMod val="75000"/>
+                </a:schemeClr>
+              </a:buClr>
+              <a:buSzPct val="145000"/>
+              <a:buFont typeface="Arial"/>
+              <a:buChar char="•"/>
+              <a:defRPr sz="2400" kern="1200" cap="none">
+                <a:solidFill>
+                  <a:schemeClr val="tx1"/>
+                </a:solidFill>
+                <a:effectLst/>
+                <a:latin typeface="+mn-lt"/>
+                <a:ea typeface="+mn-ea"/>
+                <a:cs typeface="+mn-cs"/>
+              </a:defRPr>
+            </a:lvl1pPr>
+            <a:lvl2pPr marL="742950" indent="-285750" algn="l" defTabSz="457200" rtl="0" eaLnBrk="1" latinLnBrk="0" hangingPunct="1">
+              <a:spcBef>
+                <a:spcPct val="20000"/>
+              </a:spcBef>
+              <a:spcAft>
+                <a:spcPts val="600"/>
+              </a:spcAft>
+              <a:buClr>
+                <a:schemeClr val="accent1">
+                  <a:lumMod val="75000"/>
+                </a:schemeClr>
+              </a:buClr>
+              <a:buSzPct val="145000"/>
+              <a:buFont typeface="Arial"/>
+              <a:buChar char="•"/>
+              <a:defRPr sz="2000" kern="1200" cap="none">
+                <a:solidFill>
+                  <a:schemeClr val="tx1"/>
+                </a:solidFill>
+                <a:effectLst/>
+                <a:latin typeface="+mn-lt"/>
+                <a:ea typeface="+mn-ea"/>
+                <a:cs typeface="+mn-cs"/>
+              </a:defRPr>
+            </a:lvl2pPr>
+            <a:lvl3pPr marL="1200150" indent="-285750" algn="l" defTabSz="457200" rtl="0" eaLnBrk="1" latinLnBrk="0" hangingPunct="1">
+              <a:spcBef>
+                <a:spcPct val="20000"/>
+              </a:spcBef>
+              <a:spcAft>
+                <a:spcPts val="600"/>
+              </a:spcAft>
+              <a:buClr>
+                <a:schemeClr val="accent1">
+                  <a:lumMod val="75000"/>
+                </a:schemeClr>
+              </a:buClr>
+              <a:buSzPct val="145000"/>
+              <a:buFont typeface="Arial"/>
+              <a:buChar char="•"/>
+              <a:defRPr sz="1800" kern="1200" cap="none">
+                <a:solidFill>
+                  <a:schemeClr val="tx1"/>
+                </a:solidFill>
+                <a:effectLst/>
+                <a:latin typeface="+mn-lt"/>
+                <a:ea typeface="+mn-ea"/>
+                <a:cs typeface="+mn-cs"/>
+              </a:defRPr>
+            </a:lvl3pPr>
+            <a:lvl4pPr marL="1543050" indent="-171450" algn="l" defTabSz="457200" rtl="0" eaLnBrk="1" latinLnBrk="0" hangingPunct="1">
+              <a:spcBef>
+                <a:spcPct val="20000"/>
+              </a:spcBef>
+              <a:spcAft>
+                <a:spcPts val="600"/>
+              </a:spcAft>
+              <a:buClr>
+                <a:schemeClr val="accent1">
+                  <a:lumMod val="75000"/>
+                </a:schemeClr>
+              </a:buClr>
+              <a:buSzPct val="145000"/>
+              <a:buFont typeface="Arial"/>
+              <a:buChar char="•"/>
+              <a:defRPr sz="1600" kern="1200" cap="none">
+                <a:solidFill>
+                  <a:schemeClr val="tx1"/>
+                </a:solidFill>
+                <a:effectLst/>
+                <a:latin typeface="+mn-lt"/>
+                <a:ea typeface="+mn-ea"/>
+                <a:cs typeface="+mn-cs"/>
+              </a:defRPr>
+            </a:lvl4pPr>
+            <a:lvl5pPr marL="2000250" indent="-171450" algn="l" defTabSz="457200" rtl="0" eaLnBrk="1" latinLnBrk="0" hangingPunct="1">
+              <a:spcBef>
+                <a:spcPct val="20000"/>
+              </a:spcBef>
+              <a:spcAft>
+                <a:spcPts val="600"/>
+              </a:spcAft>
+              <a:buClr>
+                <a:schemeClr val="accent1">
+                  <a:lumMod val="75000"/>
+                </a:schemeClr>
+              </a:buClr>
+              <a:buSzPct val="145000"/>
+              <a:buFont typeface="Arial"/>
+              <a:buChar char="•"/>
+              <a:defRPr sz="1400" kern="1200" cap="none">
+                <a:solidFill>
+                  <a:schemeClr val="tx1"/>
+                </a:solidFill>
+                <a:effectLst/>
+                <a:latin typeface="+mn-lt"/>
+                <a:ea typeface="+mn-ea"/>
+                <a:cs typeface="+mn-cs"/>
+              </a:defRPr>
+            </a:lvl5pPr>
+            <a:lvl6pPr marL="2514600" indent="-228600" algn="l" defTabSz="457200" rtl="0" eaLnBrk="1" latinLnBrk="0" hangingPunct="1">
+              <a:spcBef>
+                <a:spcPct val="20000"/>
+              </a:spcBef>
+              <a:spcAft>
+                <a:spcPts val="600"/>
+              </a:spcAft>
+              <a:buClr>
+                <a:schemeClr val="accent1">
+                  <a:lumMod val="75000"/>
+                </a:schemeClr>
+              </a:buClr>
+              <a:buSzPct val="145000"/>
+              <a:buFont typeface="Arial"/>
+              <a:buChar char="•"/>
+              <a:defRPr sz="1400" kern="1200" cap="none">
+                <a:solidFill>
+                  <a:schemeClr val="tx1"/>
+                </a:solidFill>
+                <a:effectLst/>
+                <a:latin typeface="+mn-lt"/>
+                <a:ea typeface="+mn-ea"/>
+                <a:cs typeface="+mn-cs"/>
+              </a:defRPr>
+            </a:lvl6pPr>
+            <a:lvl7pPr marL="2971800" indent="-228600" algn="l" defTabSz="457200" rtl="0" eaLnBrk="1" latinLnBrk="0" hangingPunct="1">
+              <a:spcBef>
+                <a:spcPct val="20000"/>
+              </a:spcBef>
+              <a:spcAft>
+                <a:spcPts val="600"/>
+              </a:spcAft>
+              <a:buClr>
+                <a:schemeClr val="accent1">
+                  <a:lumMod val="75000"/>
+                </a:schemeClr>
+              </a:buClr>
+              <a:buSzPct val="145000"/>
+              <a:buFont typeface="Arial"/>
+              <a:buChar char="•"/>
+              <a:defRPr sz="1400" kern="1200" cap="none">
+                <a:solidFill>
+                  <a:schemeClr val="tx1"/>
+                </a:solidFill>
+                <a:effectLst/>
+                <a:latin typeface="+mn-lt"/>
+                <a:ea typeface="+mn-ea"/>
+                <a:cs typeface="+mn-cs"/>
+              </a:defRPr>
+            </a:lvl7pPr>
+            <a:lvl8pPr marL="3429000" indent="-228600" algn="l" defTabSz="457200" rtl="0" eaLnBrk="1" latinLnBrk="0" hangingPunct="1">
+              <a:spcBef>
+                <a:spcPct val="20000"/>
+              </a:spcBef>
+              <a:spcAft>
+                <a:spcPts val="600"/>
+              </a:spcAft>
+              <a:buClr>
+                <a:schemeClr val="accent1">
+                  <a:lumMod val="75000"/>
+                </a:schemeClr>
+              </a:buClr>
+              <a:buSzPct val="145000"/>
+              <a:buFont typeface="Arial"/>
+              <a:buChar char="•"/>
+              <a:defRPr sz="1400" kern="1200" cap="none">
+                <a:solidFill>
+                  <a:schemeClr val="tx1"/>
+                </a:solidFill>
+                <a:effectLst/>
+                <a:latin typeface="+mn-lt"/>
+                <a:ea typeface="+mn-ea"/>
+                <a:cs typeface="+mn-cs"/>
+              </a:defRPr>
+            </a:lvl8pPr>
+            <a:lvl9pPr marL="3886200" indent="-228600" algn="l" defTabSz="457200" rtl="0" eaLnBrk="1" latinLnBrk="0" hangingPunct="1">
+              <a:spcBef>
+                <a:spcPct val="20000"/>
+              </a:spcBef>
+              <a:spcAft>
+                <a:spcPts val="600"/>
+              </a:spcAft>
+              <a:buClr>
+                <a:schemeClr val="accent1">
+                  <a:lumMod val="75000"/>
+                </a:schemeClr>
+              </a:buClr>
+              <a:buSzPct val="145000"/>
+              <a:buFont typeface="Arial"/>
+              <a:buChar char="•"/>
+              <a:defRPr sz="1400" kern="1200" cap="none">
+                <a:solidFill>
+                  <a:schemeClr val="tx1"/>
+                </a:solidFill>
+                <a:effectLst/>
+                <a:latin typeface="+mn-lt"/>
+                <a:ea typeface="+mn-ea"/>
+                <a:cs typeface="+mn-cs"/>
+              </a:defRPr>
+            </a:lvl9pPr>
+          </a:lstStyle>
+          <a:p>
+            <a:r>
+              <a:rPr lang="es-ES" dirty="0">
+                <a:latin typeface="Calibri" panose="020F0502020204030204" pitchFamily="34" charset="0"/>
+                <a:cs typeface="Calibri" panose="020F0502020204030204" pitchFamily="34" charset="0"/>
+              </a:rPr>
+              <a:t>El promedio para evitar las consecuencias más graves debería ser 3,25. Un argentino promedio produce unas 7,6 toneladas de CO2 donde el promedio mundial se encuentra en 4,5 toneladas. Aunque esto se debe en gran parte a la diferencia de desarrollo de países entre otras razones.</a:t>
+            </a:r>
+          </a:p>
+          <a:p>
+            <a:r>
+              <a:rPr lang="es-ES" dirty="0">
+                <a:latin typeface="Calibri" panose="020F0502020204030204" pitchFamily="34" charset="0"/>
+                <a:cs typeface="Calibri" panose="020F0502020204030204" pitchFamily="34" charset="0"/>
+              </a:rPr>
+              <a:t>La modernización en carácter global y el incremento de la población es un problema difícil de encarar, debido a que son variables que solo pueden incrementar con los años.</a:t>
+            </a:r>
+          </a:p>
+        </p:txBody>
+      </p:sp>
+      <p:sp>
+        <p:nvSpPr>
+          <p:cNvPr id="7" name="Title 1"/>
+          <p:cNvSpPr>
+            <a:spLocks noGrp="1"/>
+          </p:cNvSpPr>
+          <p:nvPr>
+            <p:ph type="title"/>
+          </p:nvPr>
+        </p:nvSpPr>
+        <p:spPr>
+          <a:xfrm>
+            <a:off x="1080655" y="554181"/>
+            <a:ext cx="8346723" cy="1224527"/>
+          </a:xfrm>
+        </p:spPr>
+        <p:txBody>
+          <a:bodyPr>
+            <a:normAutofit/>
+          </a:bodyPr>
+          <a:lstStyle/>
+          <a:p>
+            <a:r>
+              <a:rPr lang="es-ES" sz="5400" b="1" dirty="0">
+                <a:ln w="22225">
+                  <a:solidFill>
+                    <a:schemeClr val="accent1">
+                      <a:lumMod val="75000"/>
+                    </a:schemeClr>
+                  </a:solidFill>
+                  <a:prstDash val="solid"/>
+                </a:ln>
+                <a:solidFill>
+                  <a:schemeClr val="accent1">
+                    <a:lumMod val="60000"/>
+                    <a:lumOff val="40000"/>
+                  </a:schemeClr>
+                </a:solidFill>
+              </a:rPr>
+              <a:t>Conciencia Global</a:t>
+            </a:r>
+            <a:endParaRPr lang="es-ES" sz="5400" dirty="0"/>
+          </a:p>
+        </p:txBody>
+      </p:sp>
+    </p:spTree>
+    <p:extLst>
+      <p:ext uri="{BB962C8B-B14F-4D97-AF65-F5344CB8AC3E}">
+        <p14:creationId xmlns:p14="http://schemas.microsoft.com/office/powerpoint/2010/main" val="3412664812"/>
+      </p:ext>
+    </p:extLst>
+  </p:cSld>
+  <p:clrMapOvr>
+    <a:masterClrMapping/>
+  </p:clrMapOvr>
+</p:sld>
+</file>
+
 <file path=ppt/theme/theme1.xml><?xml version="1.0" encoding="utf-8"?>
 <a:theme xmlns:a="http://schemas.openxmlformats.org/drawingml/2006/main" name="Parallax">
   <a:themeElements>

</xml_diff>

<commit_message>
termine el power point
</commit_message>
<xml_diff>
--- a/Huella de carbono.pptx
+++ b/Huella de carbono.pptx
@@ -12,6 +12,9 @@
     <p:sldId id="261" r:id="rId6"/>
     <p:sldId id="263" r:id="rId7"/>
     <p:sldId id="262" r:id="rId8"/>
+    <p:sldId id="259" r:id="rId9"/>
+    <p:sldId id="260" r:id="rId10"/>
+    <p:sldId id="264" r:id="rId11"/>
   </p:sldIdLst>
   <p:sldSz cx="9906000" cy="6858000" type="A4"/>
   <p:notesSz cx="6858000" cy="9144000"/>
@@ -735,7 +738,7 @@
           </a:ln>
           <a:extLst>
             <a:ext uri="{91240B29-F687-4f45-9708-019B960494DF}">
-              <a14:hiddenLine xmlns:a14="http://schemas.microsoft.com/office/drawing/2010/main" xmlns="" w="9525">
+              <a14:hiddenLine xmlns="" xmlns:a14="http://schemas.microsoft.com/office/drawing/2010/main" w="9525">
                 <a:solidFill>
                   <a:srgbClr val="000000"/>
                 </a:solidFill>
@@ -790,7 +793,7 @@
           </a:ln>
           <a:extLst>
             <a:ext uri="{91240B29-F687-4f45-9708-019B960494DF}">
-              <a14:hiddenLine xmlns:a14="http://schemas.microsoft.com/office/drawing/2010/main" xmlns="" w="9525">
+              <a14:hiddenLine xmlns="" xmlns:a14="http://schemas.microsoft.com/office/drawing/2010/main" w="9525">
                 <a:solidFill>
                   <a:srgbClr val="000000"/>
                 </a:solidFill>
@@ -6421,6 +6424,131 @@
     <p:extLst>
       <p:ext uri="{BB962C8B-B14F-4D97-AF65-F5344CB8AC3E}">
         <p14:creationId xmlns:p14="http://schemas.microsoft.com/office/powerpoint/2010/main" val="365930505"/>
+      </p:ext>
+    </p:extLst>
+  </p:cSld>
+  <p:clrMapOvr>
+    <a:masterClrMapping/>
+  </p:clrMapOvr>
+</p:sld>
+</file>
+
+<file path=ppt/slides/slide10.xml><?xml version="1.0" encoding="utf-8"?>
+<p:sld xmlns:a="http://schemas.openxmlformats.org/drawingml/2006/main" xmlns:r="http://schemas.openxmlformats.org/officeDocument/2006/relationships" xmlns:p="http://schemas.openxmlformats.org/presentationml/2006/main">
+  <p:cSld>
+    <p:spTree>
+      <p:nvGrpSpPr>
+        <p:cNvPr id="1" name=""/>
+        <p:cNvGrpSpPr/>
+        <p:nvPr/>
+      </p:nvGrpSpPr>
+      <p:grpSpPr>
+        <a:xfrm>
+          <a:off x="0" y="0"/>
+          <a:ext cx="0" cy="0"/>
+          <a:chOff x="0" y="0"/>
+          <a:chExt cx="0" cy="0"/>
+        </a:xfrm>
+      </p:grpSpPr>
+      <p:sp>
+        <p:nvSpPr>
+          <p:cNvPr id="2" name="Title 1"/>
+          <p:cNvSpPr>
+            <a:spLocks noGrp="1"/>
+          </p:cNvSpPr>
+          <p:nvPr>
+            <p:ph type="title"/>
+          </p:nvPr>
+        </p:nvSpPr>
+        <p:spPr/>
+        <p:txBody>
+          <a:bodyPr/>
+          <a:lstStyle/>
+          <a:p>
+            <a:r>
+              <a:rPr lang="es-ES" b="1" dirty="0">
+                <a:ln w="22225">
+                  <a:solidFill>
+                    <a:schemeClr val="accent1">
+                      <a:lumMod val="75000"/>
+                    </a:schemeClr>
+                  </a:solidFill>
+                  <a:prstDash val="solid"/>
+                </a:ln>
+                <a:solidFill>
+                  <a:schemeClr val="accent1">
+                    <a:lumMod val="60000"/>
+                    <a:lumOff val="40000"/>
+                  </a:schemeClr>
+                </a:solidFill>
+              </a:rPr>
+              <a:t>Bibliografías</a:t>
+            </a:r>
+            <a:endParaRPr lang="es-ES" dirty="0"/>
+          </a:p>
+        </p:txBody>
+      </p:sp>
+      <p:sp>
+        <p:nvSpPr>
+          <p:cNvPr id="3" name="Content Placeholder 2"/>
+          <p:cNvSpPr>
+            <a:spLocks noGrp="1"/>
+          </p:cNvSpPr>
+          <p:nvPr>
+            <p:ph idx="1"/>
+          </p:nvPr>
+        </p:nvSpPr>
+        <p:spPr>
+          <a:xfrm>
+            <a:off x="1063978" y="2195946"/>
+            <a:ext cx="8346723" cy="3332816"/>
+          </a:xfrm>
+        </p:spPr>
+        <p:txBody>
+          <a:bodyPr/>
+          <a:lstStyle/>
+          <a:p>
+            <a:r>
+              <a:rPr lang="es-ES" dirty="0">
+                <a:hlinkClick r:id="rId2"/>
+              </a:rPr>
+              <a:t>http://www.uncuma.coop/guiacompraresponsable/seccion3_1</a:t>
+            </a:r>
+            <a:endParaRPr lang="es-ES" dirty="0"/>
+          </a:p>
+          <a:p>
+            <a:r>
+              <a:rPr lang="es-ES" dirty="0">
+                <a:hlinkClick r:id="rId3"/>
+              </a:rPr>
+              <a:t>http://www.sustentabilidadsf.org.ar/02-huella-de-carbono-nueva-web/</a:t>
+            </a:r>
+            <a:endParaRPr lang="es-ES" dirty="0"/>
+          </a:p>
+          <a:p>
+            <a:r>
+              <a:rPr lang="es-ES" dirty="0">
+                <a:hlinkClick r:id="rId4"/>
+              </a:rPr>
+              <a:t>https://www.ramcc.net/huella/</a:t>
+            </a:r>
+            <a:endParaRPr lang="es-ES" dirty="0"/>
+          </a:p>
+          <a:p>
+            <a:r>
+              <a:rPr lang="es-ES" dirty="0">
+                <a:hlinkClick r:id="rId5"/>
+              </a:rPr>
+              <a:t>https://mma.gob.cl/cambio-climatico/cc-02-7-huella-de-carbono/</a:t>
+            </a:r>
+            <a:endParaRPr lang="es-ES" dirty="0"/>
+          </a:p>
+        </p:txBody>
+      </p:sp>
+    </p:spTree>
+    <p:extLst>
+      <p:ext uri="{BB962C8B-B14F-4D97-AF65-F5344CB8AC3E}">
+        <p14:creationId xmlns:p14="http://schemas.microsoft.com/office/powerpoint/2010/main" val="2741602502"/>
       </p:ext>
     </p:extLst>
   </p:cSld>
@@ -8649,6 +8777,248 @@
 </p:sld>
 </file>
 
+<file path=ppt/slides/slide8.xml><?xml version="1.0" encoding="utf-8"?>
+<p:sld xmlns:a="http://schemas.openxmlformats.org/drawingml/2006/main" xmlns:r="http://schemas.openxmlformats.org/officeDocument/2006/relationships" xmlns:p="http://schemas.openxmlformats.org/presentationml/2006/main">
+  <p:cSld>
+    <p:spTree>
+      <p:nvGrpSpPr>
+        <p:cNvPr id="1" name=""/>
+        <p:cNvGrpSpPr/>
+        <p:nvPr/>
+      </p:nvGrpSpPr>
+      <p:grpSpPr>
+        <a:xfrm>
+          <a:off x="0" y="0"/>
+          <a:ext cx="0" cy="0"/>
+          <a:chOff x="0" y="0"/>
+          <a:chExt cx="0" cy="0"/>
+        </a:xfrm>
+      </p:grpSpPr>
+      <p:sp>
+        <p:nvSpPr>
+          <p:cNvPr id="3" name="Content Placeholder 2"/>
+          <p:cNvSpPr>
+            <a:spLocks noGrp="1"/>
+          </p:cNvSpPr>
+          <p:nvPr>
+            <p:ph idx="1"/>
+          </p:nvPr>
+        </p:nvSpPr>
+        <p:spPr>
+          <a:xfrm>
+            <a:off x="5417127" y="706581"/>
+            <a:ext cx="3851563" cy="6151419"/>
+          </a:xfrm>
+        </p:spPr>
+        <p:txBody>
+          <a:bodyPr>
+            <a:normAutofit/>
+          </a:bodyPr>
+          <a:lstStyle/>
+          <a:p>
+            <a:r>
+              <a:rPr lang="es-ES" dirty="0">
+                <a:latin typeface="Calibri" panose="020F0502020204030204" pitchFamily="34" charset="0"/>
+                <a:cs typeface="Calibri" panose="020F0502020204030204" pitchFamily="34" charset="0"/>
+              </a:rPr>
+              <a:t>Actualmente los países que más generan gases de efecto invernadero y por ende los principales entes que deberían liderar las tomas de medidas en pos de combatir la problemática en cuestión son China y EEUU.</a:t>
+            </a:r>
+          </a:p>
+          <a:p>
+            <a:endParaRPr lang="es-ES" dirty="0"/>
+          </a:p>
+        </p:txBody>
+      </p:sp>
+      <p:pic>
+        <p:nvPicPr>
+          <p:cNvPr id="4" name="Picture 3"/>
+          <p:cNvPicPr>
+            <a:picLocks noChangeAspect="1"/>
+          </p:cNvPicPr>
+          <p:nvPr/>
+        </p:nvPicPr>
+        <p:blipFill>
+          <a:blip r:embed="rId2">
+            <a:extLst>
+              <a:ext uri="{28A0092B-C50C-407E-A947-70E740481C1C}">
+                <a14:useLocalDpi xmlns:a14="http://schemas.microsoft.com/office/drawing/2010/main" val="0"/>
+              </a:ext>
+            </a:extLst>
+          </a:blip>
+          <a:stretch>
+            <a:fillRect/>
+          </a:stretch>
+        </p:blipFill>
+        <p:spPr>
+          <a:xfrm>
+            <a:off x="2424545" y="135968"/>
+            <a:ext cx="2382982" cy="6560050"/>
+          </a:xfrm>
+          <a:prstGeom prst="rect">
+            <a:avLst/>
+          </a:prstGeom>
+        </p:spPr>
+      </p:pic>
+    </p:spTree>
+    <p:extLst>
+      <p:ext uri="{BB962C8B-B14F-4D97-AF65-F5344CB8AC3E}">
+        <p14:creationId xmlns:p14="http://schemas.microsoft.com/office/powerpoint/2010/main" val="778512642"/>
+      </p:ext>
+    </p:extLst>
+  </p:cSld>
+  <p:clrMapOvr>
+    <a:masterClrMapping/>
+  </p:clrMapOvr>
+</p:sld>
+</file>
+
+<file path=ppt/slides/slide9.xml><?xml version="1.0" encoding="utf-8"?>
+<p:sld xmlns:a="http://schemas.openxmlformats.org/drawingml/2006/main" xmlns:r="http://schemas.openxmlformats.org/officeDocument/2006/relationships" xmlns:p="http://schemas.openxmlformats.org/presentationml/2006/main">
+  <p:cSld>
+    <p:spTree>
+      <p:nvGrpSpPr>
+        <p:cNvPr id="1" name=""/>
+        <p:cNvGrpSpPr/>
+        <p:nvPr/>
+      </p:nvGrpSpPr>
+      <p:grpSpPr>
+        <a:xfrm>
+          <a:off x="0" y="0"/>
+          <a:ext cx="0" cy="0"/>
+          <a:chOff x="0" y="0"/>
+          <a:chExt cx="0" cy="0"/>
+        </a:xfrm>
+      </p:grpSpPr>
+      <p:sp>
+        <p:nvSpPr>
+          <p:cNvPr id="2" name="Title 1"/>
+          <p:cNvSpPr>
+            <a:spLocks noGrp="1"/>
+          </p:cNvSpPr>
+          <p:nvPr>
+            <p:ph type="title"/>
+          </p:nvPr>
+        </p:nvSpPr>
+        <p:spPr>
+          <a:xfrm>
+            <a:off x="1216378" y="360218"/>
+            <a:ext cx="8346723" cy="1288474"/>
+          </a:xfrm>
+        </p:spPr>
+        <p:txBody>
+          <a:bodyPr/>
+          <a:lstStyle/>
+          <a:p>
+            <a:r>
+              <a:rPr lang="es-ES" b="1" dirty="0">
+                <a:ln w="22225">
+                  <a:solidFill>
+                    <a:schemeClr val="accent1">
+                      <a:lumMod val="75000"/>
+                    </a:schemeClr>
+                  </a:solidFill>
+                  <a:prstDash val="solid"/>
+                </a:ln>
+                <a:solidFill>
+                  <a:schemeClr val="accent1">
+                    <a:lumMod val="60000"/>
+                    <a:lumOff val="40000"/>
+                  </a:schemeClr>
+                </a:solidFill>
+              </a:rPr>
+              <a:t>Simples medidas a tomar</a:t>
+            </a:r>
+            <a:endParaRPr lang="es-ES" dirty="0"/>
+          </a:p>
+        </p:txBody>
+      </p:sp>
+      <p:sp>
+        <p:nvSpPr>
+          <p:cNvPr id="3" name="Content Placeholder 2"/>
+          <p:cNvSpPr>
+            <a:spLocks noGrp="1"/>
+          </p:cNvSpPr>
+          <p:nvPr>
+            <p:ph idx="1"/>
+          </p:nvPr>
+        </p:nvSpPr>
+        <p:spPr>
+          <a:xfrm>
+            <a:off x="1216377" y="1648692"/>
+            <a:ext cx="8346723" cy="4240289"/>
+          </a:xfrm>
+        </p:spPr>
+        <p:txBody>
+          <a:bodyPr>
+            <a:normAutofit/>
+          </a:bodyPr>
+          <a:lstStyle/>
+          <a:p>
+            <a:r>
+              <a:rPr lang="es-ES" dirty="0">
+                <a:latin typeface="Calibri" panose="020F0502020204030204" pitchFamily="34" charset="0"/>
+                <a:cs typeface="Calibri" panose="020F0502020204030204" pitchFamily="34" charset="0"/>
+              </a:rPr>
+              <a:t>Las herramientas que uno puede llegar a poseer para combatir esta problemática como individuos son para comenzar la información y la concientización.</a:t>
+            </a:r>
+          </a:p>
+          <a:p>
+            <a:r>
+              <a:rPr lang="es-ES" dirty="0">
+                <a:latin typeface="Calibri" panose="020F0502020204030204" pitchFamily="34" charset="0"/>
+                <a:cs typeface="Calibri" panose="020F0502020204030204" pitchFamily="34" charset="0"/>
+              </a:rPr>
+              <a:t>Reducción de consumo eléctrico y adopción de formas más ecológicas de iluminación (leds), transporte sostenible, consumo responsable, el desarrollo y apoyo de energías renovables, la conservación e incremento de las reservas forestales, el reciclaje y reutilización de materiales.</a:t>
+            </a:r>
+          </a:p>
+          <a:p>
+            <a:endParaRPr lang="es-ES" dirty="0"/>
+          </a:p>
+        </p:txBody>
+      </p:sp>
+      <p:pic>
+        <p:nvPicPr>
+          <p:cNvPr id="4" name="Picture 3"/>
+          <p:cNvPicPr>
+            <a:picLocks noChangeAspect="1"/>
+          </p:cNvPicPr>
+          <p:nvPr/>
+        </p:nvPicPr>
+        <p:blipFill>
+          <a:blip r:embed="rId2" cstate="print">
+            <a:extLst>
+              <a:ext uri="{28A0092B-C50C-407E-A947-70E740481C1C}">
+                <a14:useLocalDpi xmlns:a14="http://schemas.microsoft.com/office/drawing/2010/main" val="0"/>
+              </a:ext>
+            </a:extLst>
+          </a:blip>
+          <a:stretch>
+            <a:fillRect/>
+          </a:stretch>
+        </p:blipFill>
+        <p:spPr>
+          <a:xfrm>
+            <a:off x="6789487" y="5002290"/>
+            <a:ext cx="2773613" cy="1524000"/>
+          </a:xfrm>
+          <a:prstGeom prst="rect">
+            <a:avLst/>
+          </a:prstGeom>
+        </p:spPr>
+      </p:pic>
+    </p:spTree>
+    <p:extLst>
+      <p:ext uri="{BB962C8B-B14F-4D97-AF65-F5344CB8AC3E}">
+        <p14:creationId xmlns:p14="http://schemas.microsoft.com/office/powerpoint/2010/main" val="163556730"/>
+      </p:ext>
+    </p:extLst>
+  </p:cSld>
+  <p:clrMapOvr>
+    <a:masterClrMapping/>
+  </p:clrMapOvr>
+</p:sld>
+</file>
+
 <file path=ppt/theme/theme1.xml><?xml version="1.0" encoding="utf-8"?>
 <a:theme xmlns:a="http://schemas.openxmlformats.org/drawingml/2006/main" name="Parallax">
   <a:themeElements>

</xml_diff>